<commit_message>
Re-modified 2.4 Servients and Protocols.
1. Delete Scripting Application because it cannot plug to the other
companies in the remained days.
2. Delete the application protocol because this information doesn't
matter to this PlugFest.
</commit_message>
<xml_diff>
--- a/plugfest/2017-burlingame/CollectionServientInfo20171019-panasonic.pptx
+++ b/plugfest/2017-burlingame/CollectionServientInfo20171019-panasonic.pptx
@@ -114,7 +114,7 @@
   </p:defaultTextStyle>
   <p:extLst>
     <p:ext uri="{EFAFB233-063F-42B5-8137-9DF3F51BA10A}">
-      <p15:sldGuideLst xmlns:p15="http://schemas.microsoft.com/office/powerpoint/2012/main" xmlns="">
+      <p15:sldGuideLst xmlns="" xmlns:p15="http://schemas.microsoft.com/office/powerpoint/2012/main">
         <p15:guide id="1" orient="horz" pos="2160">
           <p15:clr>
             <a:srgbClr val="A4A3A4"/>
@@ -214,7 +214,7 @@
             <a:fld id="{3E8BF924-DA88-4FCE-A9BC-EB81A1D4C2A5}" type="datetimeFigureOut">
               <a:rPr kumimoji="1" lang="ja-JP" altLang="en-US" smtClean="0"/>
               <a:pPr/>
-              <a:t>2017/10/19</a:t>
+              <a:t>2017/10/23</a:t>
             </a:fld>
             <a:endParaRPr kumimoji="1" lang="ja-JP" altLang="en-US"/>
           </a:p>
@@ -817,7 +817,7 @@
             <a:fld id="{300EF839-8954-4B02-B699-BCFEDCE9E621}" type="datetime1">
               <a:rPr kumimoji="1" lang="ja-JP" altLang="en-US" smtClean="0"/>
               <a:pPr/>
-              <a:t>2017/10/19</a:t>
+              <a:t>2017/10/23</a:t>
             </a:fld>
             <a:endParaRPr kumimoji="1" lang="ja-JP" altLang="en-US"/>
           </a:p>
@@ -1025,7 +1025,7 @@
             <a:fld id="{382CDDB7-2A01-447F-9DD1-316C2B8B4D16}" type="datetime1">
               <a:rPr kumimoji="1" lang="ja-JP" altLang="en-US" smtClean="0"/>
               <a:pPr/>
-              <a:t>2017/10/19</a:t>
+              <a:t>2017/10/23</a:t>
             </a:fld>
             <a:endParaRPr kumimoji="1" lang="ja-JP" altLang="en-US"/>
           </a:p>
@@ -1243,7 +1243,7 @@
             <a:fld id="{FF8EC44C-2380-45CA-8785-7F8615616B00}" type="datetime1">
               <a:rPr kumimoji="1" lang="ja-JP" altLang="en-US" smtClean="0"/>
               <a:pPr/>
-              <a:t>2017/10/19</a:t>
+              <a:t>2017/10/23</a:t>
             </a:fld>
             <a:endParaRPr kumimoji="1" lang="ja-JP" altLang="en-US"/>
           </a:p>
@@ -1451,7 +1451,7 @@
             <a:fld id="{38FDC1A9-6A7A-494E-948C-6B94A8BE12C1}" type="datetime1">
               <a:rPr kumimoji="1" lang="ja-JP" altLang="en-US" smtClean="0"/>
               <a:pPr/>
-              <a:t>2017/10/19</a:t>
+              <a:t>2017/10/23</a:t>
             </a:fld>
             <a:endParaRPr kumimoji="1" lang="ja-JP" altLang="en-US"/>
           </a:p>
@@ -1701,7 +1701,7 @@
             <a:fld id="{992E78D6-6E02-479C-AC13-27E704076338}" type="datetime1">
               <a:rPr kumimoji="1" lang="ja-JP" altLang="en-US" smtClean="0"/>
               <a:pPr/>
-              <a:t>2017/10/19</a:t>
+              <a:t>2017/10/23</a:t>
             </a:fld>
             <a:endParaRPr kumimoji="1" lang="ja-JP" altLang="en-US"/>
           </a:p>
@@ -2003,7 +2003,7 @@
             <a:fld id="{C380AF01-426F-49A2-B987-23A17F0CDAEA}" type="datetime1">
               <a:rPr kumimoji="1" lang="ja-JP" altLang="en-US" smtClean="0"/>
               <a:pPr/>
-              <a:t>2017/10/19</a:t>
+              <a:t>2017/10/23</a:t>
             </a:fld>
             <a:endParaRPr kumimoji="1" lang="ja-JP" altLang="en-US"/>
           </a:p>
@@ -2440,7 +2440,7 @@
             <a:fld id="{E2ECAFC3-5E59-4FB9-9279-2D2E5ED03201}" type="datetime1">
               <a:rPr kumimoji="1" lang="ja-JP" altLang="en-US" smtClean="0"/>
               <a:pPr/>
-              <a:t>2017/10/19</a:t>
+              <a:t>2017/10/23</a:t>
             </a:fld>
             <a:endParaRPr kumimoji="1" lang="ja-JP" altLang="en-US"/>
           </a:p>
@@ -2564,7 +2564,7 @@
             <a:fld id="{CEBB6328-49D9-4207-B262-BE50C717813B}" type="datetime1">
               <a:rPr kumimoji="1" lang="ja-JP" altLang="en-US" smtClean="0"/>
               <a:pPr/>
-              <a:t>2017/10/19</a:t>
+              <a:t>2017/10/23</a:t>
             </a:fld>
             <a:endParaRPr kumimoji="1" lang="ja-JP" altLang="en-US"/>
           </a:p>
@@ -2665,7 +2665,7 @@
             <a:fld id="{83BB4F48-94C6-49C4-A48B-44DC13C6B37E}" type="datetime1">
               <a:rPr kumimoji="1" lang="ja-JP" altLang="en-US" smtClean="0"/>
               <a:pPr/>
-              <a:t>2017/10/19</a:t>
+              <a:t>2017/10/23</a:t>
             </a:fld>
             <a:endParaRPr kumimoji="1" lang="ja-JP" altLang="en-US"/>
           </a:p>
@@ -2980,7 +2980,7 @@
             <a:fld id="{EF112E10-CB9C-426C-AE2D-E720674FA422}" type="datetime1">
               <a:rPr kumimoji="1" lang="ja-JP" altLang="en-US" smtClean="0"/>
               <a:pPr/>
-              <a:t>2017/10/19</a:t>
+              <a:t>2017/10/23</a:t>
             </a:fld>
             <a:endParaRPr kumimoji="1" lang="ja-JP" altLang="en-US"/>
           </a:p>
@@ -3243,7 +3243,7 @@
             <a:fld id="{577DDD58-9E50-4495-A829-C4028BD917E6}" type="datetime1">
               <a:rPr kumimoji="1" lang="ja-JP" altLang="en-US" smtClean="0"/>
               <a:pPr/>
-              <a:t>2017/10/19</a:t>
+              <a:t>2017/10/23</a:t>
             </a:fld>
             <a:endParaRPr kumimoji="1" lang="ja-JP" altLang="en-US"/>
           </a:p>
@@ -3494,7 +3494,7 @@
             <a:fld id="{293DADB0-860D-4BC4-BE47-758CD349A265}" type="datetime1">
               <a:rPr kumimoji="1" lang="ja-JP" altLang="en-US" smtClean="0"/>
               <a:pPr/>
-              <a:t>2017/10/19</a:t>
+              <a:t>2017/10/23</a:t>
             </a:fld>
             <a:endParaRPr kumimoji="1" lang="ja-JP" altLang="en-US"/>
           </a:p>
@@ -10153,14 +10153,14 @@
             <p:ph idx="1"/>
             <p:extLst>
               <p:ext uri="{D42A27DB-BD31-4B8C-83A1-F6EECF244321}">
-                <p14:modId xmlns:p14="http://schemas.microsoft.com/office/powerpoint/2010/main" val="2861627151"/>
+                <p14:modId xmlns:p14="http://schemas.microsoft.com/office/powerpoint/2010/main" val="470979300"/>
               </p:ext>
             </p:extLst>
           </p:nvPr>
         </p:nvGraphicFramePr>
         <p:xfrm>
           <a:off x="165101" y="1825625"/>
-          <a:ext cx="8769353" cy="4480560"/>
+          <a:ext cx="8769353" cy="4566920"/>
         </p:xfrm>
         <a:graphic>
           <a:graphicData uri="http://schemas.openxmlformats.org/drawingml/2006/table">
@@ -10372,8 +10372,8 @@
                     <a:lstStyle/>
                     <a:p>
                       <a:r>
-                        <a:rPr kumimoji="1" lang="en-US" altLang="ja-JP" sz="1200" smtClean="0"/>
-                        <a:t>Scripting/NodeRED</a:t>
+                        <a:rPr kumimoji="1" lang="en-US" altLang="ja-JP" sz="1200" dirty="0" err="1" smtClean="0"/>
+                        <a:t>NodeRED</a:t>
                       </a:r>
                       <a:endParaRPr kumimoji="1" lang="ja-JP" altLang="en-US" sz="1200" dirty="0"/>
                     </a:p>
@@ -10498,21 +10498,17 @@
                   </a:txBody>
                   <a:tcPr/>
                 </a:tc>
-                <a:tc>
-                  <a:txBody>
-                    <a:bodyPr/>
-                    <a:lstStyle/>
-                    <a:p>
-                      <a:r>
-                        <a:rPr kumimoji="1" lang="de-DE" altLang="ja-JP" sz="1200" dirty="0" smtClean="0"/>
-                        <a:t>https</a:t>
-                      </a:r>
-                      <a:endParaRPr kumimoji="1" lang="ja-JP" altLang="en-US" sz="1200" dirty="0"/>
-                    </a:p>
-                  </a:txBody>
-                  <a:tcPr/>
-                </a:tc>
-                <a:tc>
+                <a:tc gridSpan="2">
+                  <a:txBody>
+                    <a:bodyPr/>
+                    <a:lstStyle/>
+                    <a:p>
+                      <a:endParaRPr lang="ja-JP" altLang="en-US" dirty="0"/>
+                    </a:p>
+                  </a:txBody>
+                  <a:tcPr/>
+                </a:tc>
+                <a:tc hMerge="1">
                   <a:txBody>
                     <a:bodyPr/>
                     <a:lstStyle/>
@@ -10534,11 +10530,7 @@
                         <a:tabLst/>
                         <a:defRPr/>
                       </a:pPr>
-                      <a:r>
-                        <a:rPr kumimoji="1" lang="en-US" altLang="ja-JP" sz="1200" dirty="0" err="1" smtClean="0"/>
-                        <a:t>https+wss</a:t>
-                      </a:r>
-                      <a:endParaRPr kumimoji="1" lang="ja-JP" altLang="en-US" sz="1200" smtClean="0"/>
+                      <a:endParaRPr kumimoji="1" lang="ja-JP" altLang="en-US" sz="1200" dirty="0" smtClean="0"/>
                     </a:p>
                   </a:txBody>
                   <a:tcPr/>
@@ -10664,7 +10656,7 @@
                     <a:bodyPr/>
                     <a:lstStyle/>
                     <a:p>
-                      <a:endParaRPr kumimoji="1" lang="ja-JP" altLang="en-US" sz="1200" dirty="0"/>
+                      <a:endParaRPr lang="ja-JP" altLang="en-US" dirty="0"/>
                     </a:p>
                   </a:txBody>
                   <a:tcPr/>
@@ -10987,22 +10979,30 @@
                   </a:txBody>
                   <a:tcPr/>
                 </a:tc>
-                <a:tc gridSpan="2">
-                  <a:txBody>
-                    <a:bodyPr/>
-                    <a:lstStyle/>
-                    <a:p>
+                <a:tc>
+                  <a:txBody>
+                    <a:bodyPr/>
+                    <a:lstStyle/>
+                    <a:p>
+                      <a:r>
+                        <a:rPr kumimoji="1" lang="en-US" altLang="ja-JP" sz="1200" smtClean="0"/>
+                        <a:t>https</a:t>
+                      </a:r>
                       <a:endParaRPr kumimoji="1" lang="ja-JP" altLang="en-US" sz="1200" dirty="0"/>
                     </a:p>
                   </a:txBody>
                   <a:tcPr/>
                 </a:tc>
-                <a:tc hMerge="1">
-                  <a:txBody>
-                    <a:bodyPr/>
-                    <a:lstStyle/>
-                    <a:p>
-                      <a:endParaRPr lang="de-DE"/>
+                <a:tc>
+                  <a:txBody>
+                    <a:bodyPr/>
+                    <a:lstStyle/>
+                    <a:p>
+                      <a:r>
+                        <a:rPr kumimoji="1" lang="en-US" altLang="ja-JP" sz="1200" dirty="0" err="1" smtClean="0"/>
+                        <a:t>https+wss</a:t>
+                      </a:r>
+                      <a:endParaRPr kumimoji="1" lang="ja-JP" altLang="en-US" sz="1200" dirty="0"/>
                     </a:p>
                   </a:txBody>
                   <a:tcPr/>
@@ -12930,7 +12930,7 @@
   <a:extraClrSchemeLst/>
   <a:extLst>
     <a:ext uri="{05A4C25C-085E-4340-85A3-A5531E510DB2}">
-      <thm15:themeFamily xmlns:thm15="http://schemas.microsoft.com/office/thememl/2012/main" xmlns="" name="Office Theme" id="{62F939B6-93AF-4DB8-9C6B-D6C7DFDC589F}" vid="{4A3C46E8-61CC-4603-A589-7422A47A8E4A}"/>
+      <thm15:themeFamily xmlns="" xmlns:thm15="http://schemas.microsoft.com/office/thememl/2012/main" name="Office Theme" id="{62F939B6-93AF-4DB8-9C6B-D6C7DFDC589F}" vid="{4A3C46E8-61CC-4603-A589-7422A47A8E4A}"/>
     </a:ext>
   </a:extLst>
 </a:theme>
@@ -13191,7 +13191,7 @@
   <a:extraClrSchemeLst/>
   <a:extLst>
     <a:ext uri="{05A4C25C-085E-4340-85A3-A5531E510DB2}">
-      <thm15:themeFamily xmlns:thm15="http://schemas.microsoft.com/office/thememl/2012/main" xmlns="" name="Office Theme" id="{62F939B6-93AF-4DB8-9C6B-D6C7DFDC589F}" vid="{4A3C46E8-61CC-4603-A589-7422A47A8E4A}"/>
+      <thm15:themeFamily xmlns="" xmlns:thm15="http://schemas.microsoft.com/office/thememl/2012/main" name="Office Theme" id="{62F939B6-93AF-4DB8-9C6B-D6C7DFDC589F}" vid="{4A3C46E8-61CC-4603-A589-7422A47A8E4A}"/>
     </a:ext>
   </a:extLst>
 </a:theme>

</xml_diff>